<commit_message>
Update PCB Schem + Objectif dev durable
</commit_message>
<xml_diff>
--- a/PCB_diagramme.pptx
+++ b/PCB_diagramme.pptx
@@ -8554,7 +8554,7 @@
               <a:buNone/>
             </a:pPr>
             <a:r>
-              <a:rPr lang="fr-FR" sz="1800" b="0" strike="noStrike" spc="-1">
+              <a:rPr lang="fr-FR" sz="1800" b="0" strike="noStrike" spc="-1" dirty="0">
                 <a:solidFill>
                   <a:srgbClr val="7030A0"/>
                 </a:solidFill>
@@ -8562,7 +8562,7 @@
               </a:rPr>
               <a:t>17395xx36</a:t>
             </a:r>
-            <a:endParaRPr lang="en-US" sz="1800" b="0" strike="noStrike" spc="-1">
+            <a:endParaRPr lang="en-US" sz="1800" b="0" strike="noStrike" spc="-1" dirty="0">
               <a:latin typeface="Arial"/>
             </a:endParaRPr>
           </a:p>
@@ -8842,15 +8842,24 @@
               <a:buNone/>
             </a:pPr>
             <a:r>
-              <a:rPr lang="fr-FR" sz="1400" b="0" strike="noStrike" spc="-1">
+              <a:rPr lang="fr-FR" sz="1400" b="0" strike="noStrike" spc="-1" dirty="0" err="1">
                 <a:solidFill>
                   <a:srgbClr val="7030A0"/>
                 </a:solidFill>
                 <a:latin typeface="Arial"/>
               </a:rPr>
-              <a:t>Tiny 8X RC Drone</a:t>
+              <a:t>Tiny</a:t>
             </a:r>
-            <a:endParaRPr lang="en-US" sz="1400" b="0" strike="noStrike" spc="-1">
+            <a:r>
+              <a:rPr lang="fr-FR" sz="1400" b="0" strike="noStrike" spc="-1" dirty="0">
+                <a:solidFill>
+                  <a:srgbClr val="7030A0"/>
+                </a:solidFill>
+                <a:latin typeface="Arial"/>
+              </a:rPr>
+              <a:t> 8X RC Drone</a:t>
+            </a:r>
+            <a:endParaRPr lang="en-US" sz="1400" b="0" strike="noStrike" spc="-1" dirty="0">
               <a:latin typeface="Arial"/>
             </a:endParaRPr>
           </a:p>
@@ -8861,7 +8870,7 @@
               </a:lnSpc>
               <a:buNone/>
             </a:pPr>
-            <a:endParaRPr lang="en-US" sz="1800" b="0" strike="noStrike" spc="-1">
+            <a:endParaRPr lang="en-US" sz="1800" b="0" strike="noStrike" spc="-1" dirty="0">
               <a:latin typeface="Arial"/>
             </a:endParaRPr>
           </a:p>
@@ -10100,7 +10109,7 @@
             </p:txBody>
           </p:sp>
         </mc:Choice>
-        <mc:Fallback xmlns="" xmlns:p14="http://schemas.microsoft.com/office/powerpoint/2010/main" xmlns:p15="http://schemas.microsoft.com/office/powerpoint/2012/main"/>
+        <mc:Fallback xmlns:p15="http://schemas.microsoft.com/office/powerpoint/2012/main" xmlns:p14="http://schemas.microsoft.com/office/powerpoint/2010/main" xmlns=""/>
       </mc:AlternateContent>
       <p:sp>
         <p:nvSpPr>
@@ -11915,8 +11924,8 @@
         </p:nvSpPr>
         <p:spPr>
           <a:xfrm>
-            <a:off x="1392120" y="1546560"/>
-            <a:ext cx="1972080" cy="599760"/>
+            <a:off x="1001159" y="1546560"/>
+            <a:ext cx="2625300" cy="599760"/>
           </a:xfrm>
           <a:prstGeom prst="rect">
             <a:avLst/>
@@ -11955,15 +11964,15 @@
               <a:buNone/>
             </a:pPr>
             <a:r>
-              <a:rPr lang="fr-FR" sz="1800" b="0" strike="noStrike" spc="-1">
+              <a:rPr lang="fr-FR" sz="1800" b="0" strike="noStrike" spc="-1" dirty="0">
                 <a:solidFill>
                   <a:srgbClr val="000000"/>
                 </a:solidFill>
                 <a:latin typeface="Calibri"/>
               </a:rPr>
-              <a:t>Régulateur</a:t>
+              <a:t>Régulateur à découpage</a:t>
             </a:r>
-            <a:endParaRPr lang="en-US" sz="1800" b="0" strike="noStrike" spc="-1">
+            <a:endParaRPr lang="en-US" sz="1800" b="0" strike="noStrike" spc="-1" dirty="0">
               <a:latin typeface="Arial"/>
             </a:endParaRPr>
           </a:p>
@@ -11975,15 +11984,10 @@
               <a:buNone/>
             </a:pPr>
             <a:r>
-              <a:rPr lang="fr-FR" sz="1800" b="0" strike="noStrike" spc="-1">
-                <a:solidFill>
-                  <a:srgbClr val="000000"/>
-                </a:solidFill>
-                <a:latin typeface="Calibri"/>
-              </a:rPr>
-              <a:t>LDO</a:t>
+              <a:rPr lang="fr-FR" dirty="0"/>
+              <a:t>17395xx36</a:t>
             </a:r>
-            <a:endParaRPr lang="en-US" sz="1800" b="0" strike="noStrike" spc="-1">
+            <a:endParaRPr lang="en-US" sz="1800" b="0" strike="noStrike" spc="-1" dirty="0">
               <a:latin typeface="Arial"/>
             </a:endParaRPr>
           </a:p>

</xml_diff>

<commit_message>
Ajout de texte au CR
</commit_message>
<xml_diff>
--- a/PCB_diagramme.pptx
+++ b/PCB_diagramme.pptx
@@ -168,7 +168,7 @@
           <a:lstStyle/>
           <a:p>
             <a:fld id="{638A57FC-E71B-4535-8442-9C07A6396E3B}" type="slidenum">
-              <a:t>‹N°›</a:t>
+              <a:t>‹#›</a:t>
             </a:fld>
             <a:endParaRPr/>
           </a:p>
@@ -387,7 +387,7 @@
           <a:lstStyle/>
           <a:p>
             <a:fld id="{D8D546A7-2D36-4E89-84F6-1BB86CE289E3}" type="slidenum">
-              <a:t>‹N°›</a:t>
+              <a:t>‹#›</a:t>
             </a:fld>
             <a:endParaRPr/>
           </a:p>
@@ -700,7 +700,7 @@
           <a:lstStyle/>
           <a:p>
             <a:fld id="{B5700210-E28A-462A-A73E-A9342603649D}" type="slidenum">
-              <a:t>‹N°›</a:t>
+              <a:t>‹#›</a:t>
             </a:fld>
             <a:endParaRPr/>
           </a:p>
@@ -1107,7 +1107,7 @@
           <a:lstStyle/>
           <a:p>
             <a:fld id="{C9A15BB5-2707-448C-9326-23C75041F2CA}" type="slidenum">
-              <a:t>‹N°›</a:t>
+              <a:t>‹#›</a:t>
             </a:fld>
             <a:endParaRPr/>
           </a:p>
@@ -1194,7 +1194,7 @@
           <a:lstStyle/>
           <a:p>
             <a:fld id="{7BE06107-3FED-487E-BBA9-DC7B5A6BDB70}" type="slidenum">
-              <a:t>‹N°›</a:t>
+              <a:t>‹#›</a:t>
             </a:fld>
             <a:endParaRPr/>
           </a:p>
@@ -1357,7 +1357,7 @@
           <a:lstStyle/>
           <a:p>
             <a:fld id="{E4331E47-D29C-4743-8CDB-C4A068D8A12D}" type="slidenum">
-              <a:t>‹N°›</a:t>
+              <a:t>‹#›</a:t>
             </a:fld>
             <a:endParaRPr/>
           </a:p>
@@ -1529,7 +1529,7 @@
           <a:lstStyle/>
           <a:p>
             <a:fld id="{5A07B405-015E-4327-9A29-57DAA3BBA198}" type="slidenum">
-              <a:t>‹N°›</a:t>
+              <a:t>‹#›</a:t>
             </a:fld>
             <a:endParaRPr/>
           </a:p>
@@ -1748,7 +1748,7 @@
           <a:lstStyle/>
           <a:p>
             <a:fld id="{A97C17CD-CB08-4E52-8F86-553756DC9D37}" type="slidenum">
-              <a:t>‹N°›</a:t>
+              <a:t>‹#›</a:t>
             </a:fld>
             <a:endParaRPr/>
           </a:p>
@@ -1873,7 +1873,7 @@
           <a:lstStyle/>
           <a:p>
             <a:fld id="{DCA8D056-40B4-48A7-855A-01CAB15B124C}" type="slidenum">
-              <a:t>‹N°›</a:t>
+              <a:t>‹#›</a:t>
             </a:fld>
             <a:endParaRPr/>
           </a:p>
@@ -1998,7 +1998,7 @@
           <a:lstStyle/>
           <a:p>
             <a:fld id="{B4286063-9F9A-4E70-8C40-F6462D75A73D}" type="slidenum">
-              <a:t>‹N°›</a:t>
+              <a:t>‹#›</a:t>
             </a:fld>
             <a:endParaRPr/>
           </a:p>
@@ -2264,7 +2264,7 @@
           <a:lstStyle/>
           <a:p>
             <a:fld id="{5DD1C56B-999E-4ED5-8F64-45A00EA0B560}" type="slidenum">
-              <a:t>‹N°›</a:t>
+              <a:t>‹#›</a:t>
             </a:fld>
             <a:endParaRPr/>
           </a:p>
@@ -2427,7 +2427,7 @@
           <a:lstStyle/>
           <a:p>
             <a:fld id="{EF953BA6-F959-4829-8C79-BFA0D7A8012B}" type="slidenum">
-              <a:t>‹N°›</a:t>
+              <a:t>‹#›</a:t>
             </a:fld>
             <a:endParaRPr/>
           </a:p>
@@ -2693,7 +2693,7 @@
           <a:lstStyle/>
           <a:p>
             <a:fld id="{BCD8E1FD-DA74-47C3-A1F7-84FBA52F1837}" type="slidenum">
-              <a:t>‹N°›</a:t>
+              <a:t>‹#›</a:t>
             </a:fld>
             <a:endParaRPr/>
           </a:p>
@@ -2959,7 +2959,7 @@
           <a:lstStyle/>
           <a:p>
             <a:fld id="{687A4AED-8147-48D6-91C3-62274C83495B}" type="slidenum">
-              <a:t>‹N°›</a:t>
+              <a:t>‹#›</a:t>
             </a:fld>
             <a:endParaRPr/>
           </a:p>
@@ -3178,7 +3178,7 @@
           <a:lstStyle/>
           <a:p>
             <a:fld id="{88B831FF-39F7-4B3A-9324-A9CAA01ECFE2}" type="slidenum">
-              <a:t>‹N°›</a:t>
+              <a:t>‹#›</a:t>
             </a:fld>
             <a:endParaRPr/>
           </a:p>
@@ -3491,7 +3491,7 @@
           <a:lstStyle/>
           <a:p>
             <a:fld id="{4B69B343-173F-4BC1-8BDE-8D36531147BD}" type="slidenum">
-              <a:t>‹N°›</a:t>
+              <a:t>‹#›</a:t>
             </a:fld>
             <a:endParaRPr/>
           </a:p>
@@ -3898,7 +3898,7 @@
           <a:lstStyle/>
           <a:p>
             <a:fld id="{33EAD20D-7D31-49D6-9BD6-50949CFD737E}" type="slidenum">
-              <a:t>‹N°›</a:t>
+              <a:t>‹#›</a:t>
             </a:fld>
             <a:endParaRPr/>
           </a:p>
@@ -4070,7 +4070,7 @@
           <a:lstStyle/>
           <a:p>
             <a:fld id="{BC189BB0-4366-42EE-BBA5-235607F1C6B1}" type="slidenum">
-              <a:t>‹N°›</a:t>
+              <a:t>‹#›</a:t>
             </a:fld>
             <a:endParaRPr/>
           </a:p>
@@ -4289,7 +4289,7 @@
           <a:lstStyle/>
           <a:p>
             <a:fld id="{949F13CE-FA77-48BD-BC92-434AE6192A6F}" type="slidenum">
-              <a:t>‹N°›</a:t>
+              <a:t>‹#›</a:t>
             </a:fld>
             <a:endParaRPr/>
           </a:p>
@@ -4414,7 +4414,7 @@
           <a:lstStyle/>
           <a:p>
             <a:fld id="{CEC7169C-C478-4E39-A97E-833FCAD2E44D}" type="slidenum">
-              <a:t>‹N°›</a:t>
+              <a:t>‹#›</a:t>
             </a:fld>
             <a:endParaRPr/>
           </a:p>
@@ -4539,7 +4539,7 @@
           <a:lstStyle/>
           <a:p>
             <a:fld id="{6942F9B3-25F7-4C6E-A1ED-19DDF73D505C}" type="slidenum">
-              <a:t>‹N°›</a:t>
+              <a:t>‹#›</a:t>
             </a:fld>
             <a:endParaRPr/>
           </a:p>
@@ -4805,7 +4805,7 @@
           <a:lstStyle/>
           <a:p>
             <a:fld id="{ED2362A0-6302-4F1A-A239-F12478B5F133}" type="slidenum">
-              <a:t>‹N°›</a:t>
+              <a:t>‹#›</a:t>
             </a:fld>
             <a:endParaRPr/>
           </a:p>
@@ -5071,7 +5071,7 @@
           <a:lstStyle/>
           <a:p>
             <a:fld id="{4688E6FA-8837-4B3F-A819-90760160B694}" type="slidenum">
-              <a:t>‹N°›</a:t>
+              <a:t>‹#›</a:t>
             </a:fld>
             <a:endParaRPr/>
           </a:p>
@@ -5337,7 +5337,7 @@
           <a:lstStyle/>
           <a:p>
             <a:fld id="{F922A260-BCE4-4080-9543-7F53B42FEFBC}" type="slidenum">
-              <a:t>‹N°›</a:t>
+              <a:t>‹#›</a:t>
             </a:fld>
             <a:endParaRPr/>
           </a:p>
@@ -5614,7 +5614,7 @@
                 </a:solidFill>
                 <a:latin typeface="Calibri"/>
               </a:rPr>
-              <a:t>‹N°›</a:t>
+              <a:t>‹#›</a:t>
             </a:fld>
             <a:endParaRPr lang="en-US" sz="1200" b="0" strike="noStrike" spc="-1">
               <a:latin typeface="Times New Roman"/>
@@ -6551,7 +6551,7 @@
                 </a:solidFill>
                 <a:latin typeface="Calibri"/>
               </a:rPr>
-              <a:t>‹N°›</a:t>
+              <a:t>‹#›</a:t>
             </a:fld>
             <a:endParaRPr lang="en-US" sz="1200" b="0" strike="noStrike" spc="-1">
               <a:latin typeface="Times New Roman"/>
@@ -9111,8 +9111,8 @@
         </p:nvSpPr>
         <p:spPr>
           <a:xfrm>
-            <a:off x="7590600" y="1046880"/>
-            <a:ext cx="3610800" cy="4767120"/>
+            <a:off x="7819200" y="186660"/>
+            <a:ext cx="3610800" cy="5444280"/>
           </a:xfrm>
           <a:prstGeom prst="roundRect">
             <a:avLst>
@@ -9333,7 +9333,7 @@
         </p:nvSpPr>
         <p:spPr>
           <a:xfrm>
-            <a:off x="8381880" y="1046880"/>
+            <a:off x="7884480" y="485428"/>
             <a:ext cx="2385000" cy="394560"/>
           </a:xfrm>
           <a:prstGeom prst="rect">
@@ -9369,7 +9369,7 @@
               <a:buNone/>
             </a:pPr>
             <a:r>
-              <a:rPr lang="fr-FR" sz="2000" b="1" u="sng" strike="noStrike" spc="-1">
+              <a:rPr lang="fr-FR" sz="2000" b="1" u="sng" strike="noStrike" spc="-1" dirty="0">
                 <a:solidFill>
                   <a:srgbClr val="C00000"/>
                 </a:solidFill>
@@ -9379,7 +9379,7 @@
               <a:t>Actionneurs</a:t>
             </a:r>
             <a:r>
-              <a:rPr lang="fr-FR" sz="1800" b="0" strike="noStrike" spc="-1">
+              <a:rPr lang="fr-FR" sz="1800" b="0" strike="noStrike" spc="-1" dirty="0">
                 <a:solidFill>
                   <a:srgbClr val="000000"/>
                 </a:solidFill>
@@ -9387,7 +9387,7 @@
               </a:rPr>
               <a:t> </a:t>
             </a:r>
-            <a:endParaRPr lang="en-US" sz="1800" b="0" strike="noStrike" spc="-1">
+            <a:endParaRPr lang="en-US" sz="1800" b="0" strike="noStrike" spc="-1" dirty="0">
               <a:latin typeface="Arial"/>
             </a:endParaRPr>
           </a:p>
@@ -9632,8 +9632,8 @@
         </p:nvSpPr>
         <p:spPr>
           <a:xfrm flipV="1">
-            <a:off x="9387360" y="1616760"/>
-            <a:ext cx="0" cy="675720"/>
+            <a:off x="9387360" y="1229380"/>
+            <a:ext cx="13140" cy="1063100"/>
           </a:xfrm>
           <a:prstGeom prst="line">
             <a:avLst/>
@@ -9666,7 +9666,7 @@
         <p:spPr>
           <a:xfrm>
             <a:off x="9387360" y="3087720"/>
-            <a:ext cx="0" cy="874440"/>
+            <a:ext cx="8280" cy="1456920"/>
           </a:xfrm>
           <a:prstGeom prst="line">
             <a:avLst/>
@@ -9764,7 +9764,7 @@
         </p:nvSpPr>
         <p:spPr>
           <a:xfrm>
-            <a:off x="7895160" y="569880"/>
+            <a:off x="7977870" y="837700"/>
             <a:ext cx="2067120" cy="577080"/>
           </a:xfrm>
           <a:prstGeom prst="rect">
@@ -9800,7 +9800,7 @@
               <a:buNone/>
             </a:pPr>
             <a:r>
-              <a:rPr lang="fr-FR" sz="3200" b="1" strike="noStrike" spc="-1">
+              <a:rPr lang="fr-FR" sz="3200" b="1" strike="noStrike" spc="-1" dirty="0">
                 <a:solidFill>
                   <a:srgbClr val="C00000"/>
                 </a:solidFill>
@@ -9808,7 +9808,7 @@
               </a:rPr>
               <a:t>x4</a:t>
             </a:r>
-            <a:endParaRPr lang="en-US" sz="3200" b="0" strike="noStrike" spc="-1">
+            <a:endParaRPr lang="en-US" sz="3200" b="0" strike="noStrike" spc="-1" dirty="0">
               <a:latin typeface="Arial"/>
             </a:endParaRPr>
           </a:p>
@@ -9822,7 +9822,7 @@
         </p:nvSpPr>
         <p:spPr>
           <a:xfrm>
-            <a:off x="9273240" y="3867840"/>
+            <a:off x="9316260" y="845260"/>
             <a:ext cx="254880" cy="384120"/>
           </a:xfrm>
           <a:prstGeom prst="rect">
@@ -9984,39 +9984,6 @@
       </p:sp>
       <p:sp>
         <p:nvSpPr>
-          <p:cNvPr id="146" name="Straight Connector 44"/>
-          <p:cNvSpPr/>
-          <p:nvPr/>
-        </p:nvSpPr>
-        <p:spPr>
-          <a:xfrm>
-            <a:off x="9395640" y="4278240"/>
-            <a:ext cx="360" cy="291600"/>
-          </a:xfrm>
-          <a:prstGeom prst="line">
-            <a:avLst/>
-          </a:prstGeom>
-          <a:ln>
-            <a:solidFill>
-              <a:srgbClr val="000000"/>
-            </a:solidFill>
-          </a:ln>
-        </p:spPr>
-        <p:style>
-          <a:lnRef idx="1">
-            <a:schemeClr val="accent1"/>
-          </a:lnRef>
-          <a:fillRef idx="0">
-            <a:schemeClr val="accent1"/>
-          </a:fillRef>
-          <a:effectRef idx="0">
-            <a:schemeClr val="accent1"/>
-          </a:effectRef>
-          <a:fontRef idx="minor"/>
-        </p:style>
-      </p:sp>
-      <p:sp>
-        <p:nvSpPr>
           <p:cNvPr id="147" name="Straight Connector 45"/>
           <p:cNvSpPr/>
           <p:nvPr/>
@@ -10024,7 +9991,7 @@
         <p:spPr>
           <a:xfrm>
             <a:off x="9401040" y="4975920"/>
-            <a:ext cx="360" cy="291600"/>
+            <a:ext cx="27000" cy="453240"/>
           </a:xfrm>
           <a:prstGeom prst="line">
             <a:avLst/>
@@ -10109,7 +10076,7 @@
             </p:txBody>
           </p:sp>
         </mc:Choice>
-        <mc:Fallback xmlns:p15="http://schemas.microsoft.com/office/powerpoint/2012/main" xmlns:p14="http://schemas.microsoft.com/office/powerpoint/2010/main" xmlns=""/>
+        <mc:Fallback xmlns="" xmlns:p14="http://schemas.microsoft.com/office/powerpoint/2010/main" xmlns:p15="http://schemas.microsoft.com/office/powerpoint/2012/main"/>
       </mc:AlternateContent>
       <p:sp>
         <p:nvSpPr>
@@ -10118,9 +10085,9 @@
           <p:nvPr/>
         </p:nvSpPr>
         <p:spPr>
-          <a:xfrm>
-            <a:off x="9387360" y="3675960"/>
-            <a:ext cx="574920" cy="360"/>
+          <a:xfrm flipV="1">
+            <a:off x="9438658" y="653740"/>
+            <a:ext cx="566641" cy="5614"/>
           </a:xfrm>
           <a:prstGeom prst="line">
             <a:avLst/>
@@ -10151,9 +10118,9 @@
           <p:nvPr/>
         </p:nvSpPr>
         <p:spPr>
-          <a:xfrm>
-            <a:off x="9395640" y="4429440"/>
-            <a:ext cx="566640" cy="360"/>
+          <a:xfrm flipV="1">
+            <a:off x="9404378" y="1407220"/>
+            <a:ext cx="600922" cy="1732"/>
           </a:xfrm>
           <a:prstGeom prst="line">
             <a:avLst/>
@@ -10185,7 +10152,7 @@
         </p:nvSpPr>
         <p:spPr>
           <a:xfrm>
-            <a:off x="9962280" y="3672360"/>
+            <a:off x="10005300" y="649780"/>
             <a:ext cx="360" cy="210240"/>
           </a:xfrm>
           <a:prstGeom prst="line">
@@ -10217,9 +10184,9 @@
           <p:nvPr/>
         </p:nvSpPr>
         <p:spPr>
-          <a:xfrm>
-            <a:off x="9965520" y="4228920"/>
-            <a:ext cx="360" cy="210600"/>
+          <a:xfrm flipH="1">
+            <a:off x="10009178" y="1207654"/>
+            <a:ext cx="0" cy="204253"/>
           </a:xfrm>
           <a:prstGeom prst="line">
             <a:avLst/>
@@ -10251,7 +10218,7 @@
         </p:nvSpPr>
         <p:spPr>
           <a:xfrm>
-            <a:off x="9962280" y="3885480"/>
+            <a:off x="10005300" y="862900"/>
             <a:ext cx="177840" cy="360"/>
           </a:xfrm>
           <a:prstGeom prst="line">
@@ -10284,7 +10251,7 @@
         </p:nvSpPr>
         <p:spPr>
           <a:xfrm>
-            <a:off x="9962280" y="4228920"/>
+            <a:off x="10005300" y="1206340"/>
             <a:ext cx="195840" cy="360"/>
           </a:xfrm>
           <a:prstGeom prst="line">
@@ -10317,7 +10284,7 @@
         </p:nvSpPr>
         <p:spPr>
           <a:xfrm rot="5400000">
-            <a:off x="10093680" y="3828240"/>
+            <a:off x="10136700" y="805660"/>
             <a:ext cx="556200" cy="455040"/>
           </a:xfrm>
           <a:prstGeom prst="triangle">
@@ -10354,9 +10321,9 @@
           <p:nvPr/>
         </p:nvSpPr>
         <p:spPr>
-          <a:xfrm>
-            <a:off x="10599120" y="4055760"/>
-            <a:ext cx="970560" cy="360"/>
+          <a:xfrm flipV="1">
+            <a:off x="11438640" y="4067640"/>
+            <a:ext cx="130320" cy="0"/>
           </a:xfrm>
           <a:prstGeom prst="line">
             <a:avLst/>
@@ -10518,14 +10485,14 @@
           <a:lstStyle/>
           <a:p>
             <a:r>
-              <a:rPr lang="en-US" sz="1800" b="0" strike="noStrike" spc="-1">
+              <a:rPr lang="en-US" sz="1800" b="0" strike="noStrike" spc="-1" dirty="0">
                 <a:latin typeface="Arial"/>
               </a:rPr>
-              <a:t>Analogique x’</a:t>
+              <a:t> </a:t>
             </a:r>
           </a:p>
           <a:p>
-            <a:endParaRPr lang="en-US" sz="1800" b="0" strike="noStrike" spc="-1">
+            <a:endParaRPr lang="en-US" sz="1800" b="0" strike="noStrike" spc="-1" dirty="0">
               <a:latin typeface="Arial"/>
             </a:endParaRPr>
           </a:p>
@@ -11223,7 +11190,7 @@
         </p:nvSpPr>
         <p:spPr>
           <a:xfrm flipV="1">
-            <a:off x="9118440" y="1560240"/>
+            <a:off x="9198777" y="248988"/>
             <a:ext cx="360" cy="190440"/>
           </a:xfrm>
           <a:prstGeom prst="line">
@@ -11256,7 +11223,7 @@
         </p:nvSpPr>
         <p:spPr>
           <a:xfrm flipV="1">
-            <a:off x="9677160" y="1560240"/>
+            <a:off x="9688697" y="243508"/>
             <a:ext cx="360" cy="190440"/>
           </a:xfrm>
           <a:prstGeom prst="line">
@@ -11280,6 +11247,13 @@
           </a:effectRef>
           <a:fontRef idx="minor"/>
         </p:style>
+        <p:txBody>
+          <a:bodyPr/>
+          <a:lstStyle/>
+          <a:p>
+            <a:endParaRPr lang="fr-FR" dirty="0"/>
+          </a:p>
+        </p:txBody>
       </p:sp>
       <p:sp>
         <p:nvSpPr>
@@ -11289,8 +11263,8 @@
         </p:nvSpPr>
         <p:spPr>
           <a:xfrm flipH="1">
-            <a:off x="9118440" y="1560240"/>
-            <a:ext cx="565200" cy="360"/>
+            <a:off x="9201410" y="242980"/>
+            <a:ext cx="487040" cy="4028"/>
           </a:xfrm>
           <a:prstGeom prst="line">
             <a:avLst/>
@@ -11322,8 +11296,8 @@
         </p:nvSpPr>
         <p:spPr>
           <a:xfrm flipH="1">
-            <a:off x="6480720" y="1555560"/>
-            <a:ext cx="2637720" cy="360"/>
+            <a:off x="6517080" y="627820"/>
+            <a:ext cx="2921580" cy="0"/>
           </a:xfrm>
           <a:prstGeom prst="line">
             <a:avLst/>
@@ -11343,39 +11317,6 @@
           </a:fillRef>
           <a:effectRef idx="0">
             <a:schemeClr val="dk1"/>
-          </a:effectRef>
-          <a:fontRef idx="minor"/>
-        </p:style>
-      </p:sp>
-      <p:sp>
-        <p:nvSpPr>
-          <p:cNvPr id="183" name="Straight Connector 108"/>
-          <p:cNvSpPr/>
-          <p:nvPr/>
-        </p:nvSpPr>
-        <p:spPr>
-          <a:xfrm flipV="1">
-            <a:off x="6517080" y="952200"/>
-            <a:ext cx="360" cy="595800"/>
-          </a:xfrm>
-          <a:prstGeom prst="line">
-            <a:avLst/>
-          </a:prstGeom>
-          <a:ln>
-            <a:solidFill>
-              <a:srgbClr val="00B0F0"/>
-            </a:solidFill>
-          </a:ln>
-        </p:spPr>
-        <p:style>
-          <a:lnRef idx="1">
-            <a:schemeClr val="accent1"/>
-          </a:lnRef>
-          <a:fillRef idx="0">
-            <a:schemeClr val="accent1"/>
-          </a:fillRef>
-          <a:effectRef idx="0">
-            <a:schemeClr val="accent1"/>
           </a:effectRef>
           <a:fontRef idx="minor"/>
         </p:style>
@@ -11659,9 +11600,9 @@
           <p:nvPr/>
         </p:nvSpPr>
         <p:spPr>
-          <a:xfrm flipH="1" flipV="1">
-            <a:off x="5776200" y="3581640"/>
-            <a:ext cx="545040" cy="720"/>
+          <a:xfrm flipH="1">
+            <a:off x="5784840" y="3573720"/>
+            <a:ext cx="530280" cy="0"/>
           </a:xfrm>
           <a:prstGeom prst="line">
             <a:avLst/>
@@ -11681,39 +11622,6 @@
           </a:fillRef>
           <a:effectRef idx="0">
             <a:schemeClr val="accent1"/>
-          </a:effectRef>
-          <a:fontRef idx="minor"/>
-        </p:style>
-      </p:sp>
-      <p:sp>
-        <p:nvSpPr>
-          <p:cNvPr id="191" name="Straight Connector 133"/>
-          <p:cNvSpPr/>
-          <p:nvPr/>
-        </p:nvSpPr>
-        <p:spPr>
-          <a:xfrm>
-            <a:off x="9395640" y="5163840"/>
-            <a:ext cx="0" cy="264960"/>
-          </a:xfrm>
-          <a:prstGeom prst="line">
-            <a:avLst/>
-          </a:prstGeom>
-          <a:ln>
-            <a:solidFill>
-              <a:srgbClr val="000000"/>
-            </a:solidFill>
-          </a:ln>
-        </p:spPr>
-        <p:style>
-          <a:lnRef idx="1">
-            <a:schemeClr val="dk1"/>
-          </a:lnRef>
-          <a:fillRef idx="0">
-            <a:schemeClr val="dk1"/>
-          </a:fillRef>
-          <a:effectRef idx="0">
-            <a:schemeClr val="dk1"/>
           </a:effectRef>
           <a:fontRef idx="minor"/>
         </p:style>
@@ -12774,7 +12682,7 @@
               <a:buNone/>
             </a:pPr>
             <a:r>
-              <a:rPr lang="fr-FR" sz="1800" b="0" strike="noStrike" spc="-1">
+              <a:rPr lang="fr-FR" sz="1800" b="0" strike="noStrike" spc="-1" dirty="0">
                 <a:solidFill>
                   <a:srgbClr val="000000"/>
                 </a:solidFill>
@@ -12782,7 +12690,7 @@
               </a:rPr>
               <a:t>Ampli de courant</a:t>
             </a:r>
-            <a:endParaRPr lang="en-US" sz="1800" b="0" strike="noStrike" spc="-1">
+            <a:endParaRPr lang="en-US" sz="1800" b="0" strike="noStrike" spc="-1" dirty="0">
               <a:latin typeface="Arial"/>
             </a:endParaRPr>
           </a:p>
@@ -12996,6 +12904,615 @@
             <a:endParaRPr lang="en-US" sz="1800" b="0" strike="noStrike" spc="-1">
               <a:latin typeface="Arial"/>
             </a:endParaRPr>
+          </a:p>
+        </p:txBody>
+      </p:sp>
+      <p:sp>
+        <p:nvSpPr>
+          <p:cNvPr id="2" name="Rectangle 29">
+            <a:extLst>
+              <a:ext uri="{FF2B5EF4-FFF2-40B4-BE49-F238E27FC236}">
+                <a16:creationId xmlns:a16="http://schemas.microsoft.com/office/drawing/2014/main" id="{D8205C9E-6BAD-07A8-0DFC-0C9BD104899B}"/>
+              </a:ext>
+            </a:extLst>
+          </p:cNvPr>
+          <p:cNvSpPr/>
+          <p:nvPr/>
+        </p:nvSpPr>
+        <p:spPr>
+          <a:xfrm>
+            <a:off x="9316080" y="845260"/>
+            <a:ext cx="254880" cy="384120"/>
+          </a:xfrm>
+          <a:prstGeom prst="rect">
+            <a:avLst/>
+          </a:prstGeom>
+          <a:solidFill>
+            <a:srgbClr val="FFFFFF"/>
+          </a:solidFill>
+          <a:ln>
+            <a:solidFill>
+              <a:srgbClr val="000000"/>
+            </a:solidFill>
+          </a:ln>
+        </p:spPr>
+        <p:style>
+          <a:lnRef idx="2">
+            <a:schemeClr val="accent6"/>
+          </a:lnRef>
+          <a:fillRef idx="1">
+            <a:schemeClr val="lt1"/>
+          </a:fillRef>
+          <a:effectRef idx="0">
+            <a:schemeClr val="accent6"/>
+          </a:effectRef>
+          <a:fontRef idx="minor"/>
+        </p:style>
+      </p:sp>
+      <p:cxnSp>
+        <p:nvCxnSpPr>
+          <p:cNvPr id="5" name="Straight Connector 4">
+            <a:extLst>
+              <a:ext uri="{FF2B5EF4-FFF2-40B4-BE49-F238E27FC236}">
+                <a16:creationId xmlns:a16="http://schemas.microsoft.com/office/drawing/2014/main" id="{E812C6CE-8931-9C17-78A7-C02BBC8574DE}"/>
+              </a:ext>
+            </a:extLst>
+          </p:cNvPr>
+          <p:cNvCxnSpPr>
+            <a:cxnSpLocks/>
+            <a:stCxn id="2" idx="0"/>
+          </p:cNvCxnSpPr>
+          <p:nvPr/>
+        </p:nvCxnSpPr>
+        <p:spPr>
+          <a:xfrm flipV="1">
+            <a:off x="9443520" y="257400"/>
+            <a:ext cx="0" cy="587860"/>
+          </a:xfrm>
+          <a:prstGeom prst="line">
+            <a:avLst/>
+          </a:prstGeom>
+          <a:ln>
+            <a:solidFill>
+              <a:schemeClr val="tx1"/>
+            </a:solidFill>
+          </a:ln>
+        </p:spPr>
+        <p:style>
+          <a:lnRef idx="1">
+            <a:schemeClr val="dk1"/>
+          </a:lnRef>
+          <a:fillRef idx="0">
+            <a:schemeClr val="dk1"/>
+          </a:fillRef>
+          <a:effectRef idx="0">
+            <a:schemeClr val="dk1"/>
+          </a:effectRef>
+          <a:fontRef idx="minor">
+            <a:schemeClr val="tx1"/>
+          </a:fontRef>
+        </p:style>
+      </p:cxnSp>
+      <p:cxnSp>
+        <p:nvCxnSpPr>
+          <p:cNvPr id="7" name="Straight Connector 6">
+            <a:extLst>
+              <a:ext uri="{FF2B5EF4-FFF2-40B4-BE49-F238E27FC236}">
+                <a16:creationId xmlns:a16="http://schemas.microsoft.com/office/drawing/2014/main" id="{FC86E3E1-B955-0281-BBAF-D0AA6DD1571B}"/>
+              </a:ext>
+            </a:extLst>
+          </p:cNvPr>
+          <p:cNvCxnSpPr>
+            <a:cxnSpLocks/>
+            <a:stCxn id="184" idx="0"/>
+            <a:endCxn id="182" idx="1"/>
+          </p:cNvCxnSpPr>
+          <p:nvPr/>
+        </p:nvCxnSpPr>
+        <p:spPr>
+          <a:xfrm flipV="1">
+            <a:off x="6517080" y="627821"/>
+            <a:ext cx="0" cy="339859"/>
+          </a:xfrm>
+          <a:prstGeom prst="line">
+            <a:avLst/>
+          </a:prstGeom>
+          <a:ln>
+            <a:solidFill>
+              <a:srgbClr val="00B0F0"/>
+            </a:solidFill>
+          </a:ln>
+        </p:spPr>
+        <p:style>
+          <a:lnRef idx="1">
+            <a:schemeClr val="dk1"/>
+          </a:lnRef>
+          <a:fillRef idx="0">
+            <a:schemeClr val="dk1"/>
+          </a:fillRef>
+          <a:effectRef idx="0">
+            <a:schemeClr val="dk1"/>
+          </a:effectRef>
+          <a:fontRef idx="minor"/>
+        </p:style>
+      </p:cxnSp>
+      <p:cxnSp>
+        <p:nvCxnSpPr>
+          <p:cNvPr id="11" name="Straight Connector 10">
+            <a:extLst>
+              <a:ext uri="{FF2B5EF4-FFF2-40B4-BE49-F238E27FC236}">
+                <a16:creationId xmlns:a16="http://schemas.microsoft.com/office/drawing/2014/main" id="{AF8B6BF3-6D0C-929D-49A8-F486360A86C1}"/>
+              </a:ext>
+            </a:extLst>
+          </p:cNvPr>
+          <p:cNvCxnSpPr>
+            <a:cxnSpLocks/>
+          </p:cNvCxnSpPr>
+          <p:nvPr/>
+        </p:nvCxnSpPr>
+        <p:spPr>
+          <a:xfrm flipV="1">
+            <a:off x="10106940" y="555480"/>
+            <a:ext cx="0" cy="307780"/>
+          </a:xfrm>
+          <a:prstGeom prst="line">
+            <a:avLst/>
+          </a:prstGeom>
+        </p:spPr>
+        <p:style>
+          <a:lnRef idx="1">
+            <a:schemeClr val="dk1"/>
+          </a:lnRef>
+          <a:fillRef idx="0">
+            <a:schemeClr val="dk1"/>
+          </a:fillRef>
+          <a:effectRef idx="0">
+            <a:schemeClr val="dk1"/>
+          </a:effectRef>
+          <a:fontRef idx="minor">
+            <a:schemeClr val="tx1"/>
+          </a:fontRef>
+        </p:style>
+      </p:cxnSp>
+      <p:cxnSp>
+        <p:nvCxnSpPr>
+          <p:cNvPr id="14" name="Straight Connector 13">
+            <a:extLst>
+              <a:ext uri="{FF2B5EF4-FFF2-40B4-BE49-F238E27FC236}">
+                <a16:creationId xmlns:a16="http://schemas.microsoft.com/office/drawing/2014/main" id="{6CDA9A3C-FC1F-2176-06F7-CE500E1D492B}"/>
+              </a:ext>
+            </a:extLst>
+          </p:cNvPr>
+          <p:cNvCxnSpPr/>
+          <p:nvPr/>
+        </p:nvCxnSpPr>
+        <p:spPr>
+          <a:xfrm>
+            <a:off x="9961920" y="530440"/>
+            <a:ext cx="325080" cy="0"/>
+          </a:xfrm>
+          <a:prstGeom prst="line">
+            <a:avLst/>
+          </a:prstGeom>
+        </p:spPr>
+        <p:style>
+          <a:lnRef idx="1">
+            <a:schemeClr val="dk1"/>
+          </a:lnRef>
+          <a:fillRef idx="0">
+            <a:schemeClr val="dk1"/>
+          </a:fillRef>
+          <a:effectRef idx="0">
+            <a:schemeClr val="dk1"/>
+          </a:effectRef>
+          <a:fontRef idx="minor">
+            <a:schemeClr val="tx1"/>
+          </a:fontRef>
+        </p:style>
+      </p:cxnSp>
+      <p:cxnSp>
+        <p:nvCxnSpPr>
+          <p:cNvPr id="15" name="Straight Connector 14">
+            <a:extLst>
+              <a:ext uri="{FF2B5EF4-FFF2-40B4-BE49-F238E27FC236}">
+                <a16:creationId xmlns:a16="http://schemas.microsoft.com/office/drawing/2014/main" id="{CF47083B-F847-6597-C291-59B0E4D76BEF}"/>
+              </a:ext>
+            </a:extLst>
+          </p:cNvPr>
+          <p:cNvCxnSpPr/>
+          <p:nvPr/>
+        </p:nvCxnSpPr>
+        <p:spPr>
+          <a:xfrm>
+            <a:off x="9944400" y="399420"/>
+            <a:ext cx="325080" cy="0"/>
+          </a:xfrm>
+          <a:prstGeom prst="line">
+            <a:avLst/>
+          </a:prstGeom>
+        </p:spPr>
+        <p:style>
+          <a:lnRef idx="1">
+            <a:schemeClr val="dk1"/>
+          </a:lnRef>
+          <a:fillRef idx="0">
+            <a:schemeClr val="dk1"/>
+          </a:fillRef>
+          <a:effectRef idx="0">
+            <a:schemeClr val="dk1"/>
+          </a:effectRef>
+          <a:fontRef idx="minor">
+            <a:schemeClr val="tx1"/>
+          </a:fontRef>
+        </p:style>
+      </p:cxnSp>
+      <p:cxnSp>
+        <p:nvCxnSpPr>
+          <p:cNvPr id="16" name="Straight Connector 15">
+            <a:extLst>
+              <a:ext uri="{FF2B5EF4-FFF2-40B4-BE49-F238E27FC236}">
+                <a16:creationId xmlns:a16="http://schemas.microsoft.com/office/drawing/2014/main" id="{4620E1B6-55F2-09BA-A914-B9020A23D9BA}"/>
+              </a:ext>
+            </a:extLst>
+          </p:cNvPr>
+          <p:cNvCxnSpPr>
+            <a:cxnSpLocks/>
+          </p:cNvCxnSpPr>
+          <p:nvPr/>
+        </p:nvCxnSpPr>
+        <p:spPr>
+          <a:xfrm flipV="1">
+            <a:off x="10106940" y="233021"/>
+            <a:ext cx="0" cy="166399"/>
+          </a:xfrm>
+          <a:prstGeom prst="line">
+            <a:avLst/>
+          </a:prstGeom>
+        </p:spPr>
+        <p:style>
+          <a:lnRef idx="1">
+            <a:schemeClr val="dk1"/>
+          </a:lnRef>
+          <a:fillRef idx="0">
+            <a:schemeClr val="dk1"/>
+          </a:fillRef>
+          <a:effectRef idx="0">
+            <a:schemeClr val="dk1"/>
+          </a:effectRef>
+          <a:fontRef idx="minor">
+            <a:schemeClr val="tx1"/>
+          </a:fontRef>
+        </p:style>
+      </p:cxnSp>
+      <p:cxnSp>
+        <p:nvCxnSpPr>
+          <p:cNvPr id="19" name="Straight Connector 18">
+            <a:extLst>
+              <a:ext uri="{FF2B5EF4-FFF2-40B4-BE49-F238E27FC236}">
+                <a16:creationId xmlns:a16="http://schemas.microsoft.com/office/drawing/2014/main" id="{6F834A4C-3880-3D54-8198-B7A98B5EB0BD}"/>
+              </a:ext>
+            </a:extLst>
+          </p:cNvPr>
+          <p:cNvCxnSpPr/>
+          <p:nvPr/>
+        </p:nvCxnSpPr>
+        <p:spPr>
+          <a:xfrm>
+            <a:off x="9915465" y="236291"/>
+            <a:ext cx="409680" cy="0"/>
+          </a:xfrm>
+          <a:prstGeom prst="line">
+            <a:avLst/>
+          </a:prstGeom>
+        </p:spPr>
+        <p:style>
+          <a:lnRef idx="1">
+            <a:schemeClr val="dk1"/>
+          </a:lnRef>
+          <a:fillRef idx="0">
+            <a:schemeClr val="dk1"/>
+          </a:fillRef>
+          <a:effectRef idx="0">
+            <a:schemeClr val="dk1"/>
+          </a:effectRef>
+          <a:fontRef idx="minor">
+            <a:schemeClr val="tx1"/>
+          </a:fontRef>
+        </p:style>
+      </p:cxnSp>
+      <p:cxnSp>
+        <p:nvCxnSpPr>
+          <p:cNvPr id="33" name="Straight Connector 32">
+            <a:extLst>
+              <a:ext uri="{FF2B5EF4-FFF2-40B4-BE49-F238E27FC236}">
+                <a16:creationId xmlns:a16="http://schemas.microsoft.com/office/drawing/2014/main" id="{FB0689B3-CEB3-EA4C-A0BF-46063BE0316D}"/>
+              </a:ext>
+            </a:extLst>
+          </p:cNvPr>
+          <p:cNvCxnSpPr>
+            <a:cxnSpLocks/>
+          </p:cNvCxnSpPr>
+          <p:nvPr/>
+        </p:nvCxnSpPr>
+        <p:spPr>
+          <a:xfrm flipV="1">
+            <a:off x="10000020" y="174781"/>
+            <a:ext cx="74115" cy="58240"/>
+          </a:xfrm>
+          <a:prstGeom prst="line">
+            <a:avLst/>
+          </a:prstGeom>
+          <a:ln>
+            <a:solidFill>
+              <a:schemeClr val="tx1"/>
+            </a:solidFill>
+          </a:ln>
+        </p:spPr>
+        <p:style>
+          <a:lnRef idx="1">
+            <a:schemeClr val="accent1"/>
+          </a:lnRef>
+          <a:fillRef idx="0">
+            <a:schemeClr val="accent1"/>
+          </a:fillRef>
+          <a:effectRef idx="0">
+            <a:schemeClr val="accent1"/>
+          </a:effectRef>
+          <a:fontRef idx="minor">
+            <a:schemeClr val="tx1"/>
+          </a:fontRef>
+        </p:style>
+      </p:cxnSp>
+      <p:cxnSp>
+        <p:nvCxnSpPr>
+          <p:cNvPr id="46" name="Straight Connector 45">
+            <a:extLst>
+              <a:ext uri="{FF2B5EF4-FFF2-40B4-BE49-F238E27FC236}">
+                <a16:creationId xmlns:a16="http://schemas.microsoft.com/office/drawing/2014/main" id="{9337BD61-AB33-CD36-ED13-3B002D1BABB3}"/>
+              </a:ext>
+            </a:extLst>
+          </p:cNvPr>
+          <p:cNvCxnSpPr>
+            <a:cxnSpLocks/>
+          </p:cNvCxnSpPr>
+          <p:nvPr/>
+        </p:nvCxnSpPr>
+        <p:spPr>
+          <a:xfrm flipV="1">
+            <a:off x="10066162" y="176103"/>
+            <a:ext cx="74115" cy="58240"/>
+          </a:xfrm>
+          <a:prstGeom prst="line">
+            <a:avLst/>
+          </a:prstGeom>
+          <a:ln>
+            <a:solidFill>
+              <a:schemeClr val="tx1"/>
+            </a:solidFill>
+          </a:ln>
+        </p:spPr>
+        <p:style>
+          <a:lnRef idx="1">
+            <a:schemeClr val="accent1"/>
+          </a:lnRef>
+          <a:fillRef idx="0">
+            <a:schemeClr val="accent1"/>
+          </a:fillRef>
+          <a:effectRef idx="0">
+            <a:schemeClr val="accent1"/>
+          </a:effectRef>
+          <a:fontRef idx="minor">
+            <a:schemeClr val="tx1"/>
+          </a:fontRef>
+        </p:style>
+      </p:cxnSp>
+      <p:cxnSp>
+        <p:nvCxnSpPr>
+          <p:cNvPr id="47" name="Straight Connector 46">
+            <a:extLst>
+              <a:ext uri="{FF2B5EF4-FFF2-40B4-BE49-F238E27FC236}">
+                <a16:creationId xmlns:a16="http://schemas.microsoft.com/office/drawing/2014/main" id="{3DD49AFF-71F7-12B3-A895-98E9AA172AF4}"/>
+              </a:ext>
+            </a:extLst>
+          </p:cNvPr>
+          <p:cNvCxnSpPr>
+            <a:cxnSpLocks/>
+          </p:cNvCxnSpPr>
+          <p:nvPr/>
+        </p:nvCxnSpPr>
+        <p:spPr>
+          <a:xfrm flipV="1">
+            <a:off x="10150717" y="180300"/>
+            <a:ext cx="74115" cy="58240"/>
+          </a:xfrm>
+          <a:prstGeom prst="line">
+            <a:avLst/>
+          </a:prstGeom>
+          <a:ln>
+            <a:solidFill>
+              <a:schemeClr val="tx1"/>
+            </a:solidFill>
+          </a:ln>
+        </p:spPr>
+        <p:style>
+          <a:lnRef idx="1">
+            <a:schemeClr val="accent1"/>
+          </a:lnRef>
+          <a:fillRef idx="0">
+            <a:schemeClr val="accent1"/>
+          </a:fillRef>
+          <a:effectRef idx="0">
+            <a:schemeClr val="accent1"/>
+          </a:effectRef>
+          <a:fontRef idx="minor">
+            <a:schemeClr val="tx1"/>
+          </a:fontRef>
+        </p:style>
+      </p:cxnSp>
+      <p:cxnSp>
+        <p:nvCxnSpPr>
+          <p:cNvPr id="48" name="Straight Connector 47">
+            <a:extLst>
+              <a:ext uri="{FF2B5EF4-FFF2-40B4-BE49-F238E27FC236}">
+                <a16:creationId xmlns:a16="http://schemas.microsoft.com/office/drawing/2014/main" id="{FF738034-6636-CE40-3CDD-2E758143DDDC}"/>
+              </a:ext>
+            </a:extLst>
+          </p:cNvPr>
+          <p:cNvCxnSpPr>
+            <a:cxnSpLocks/>
+          </p:cNvCxnSpPr>
+          <p:nvPr/>
+        </p:nvCxnSpPr>
+        <p:spPr>
+          <a:xfrm flipV="1">
+            <a:off x="10212525" y="180300"/>
+            <a:ext cx="74115" cy="58240"/>
+          </a:xfrm>
+          <a:prstGeom prst="line">
+            <a:avLst/>
+          </a:prstGeom>
+          <a:ln>
+            <a:solidFill>
+              <a:schemeClr val="tx1"/>
+            </a:solidFill>
+          </a:ln>
+        </p:spPr>
+        <p:style>
+          <a:lnRef idx="1">
+            <a:schemeClr val="accent1"/>
+          </a:lnRef>
+          <a:fillRef idx="0">
+            <a:schemeClr val="accent1"/>
+          </a:fillRef>
+          <a:effectRef idx="0">
+            <a:schemeClr val="accent1"/>
+          </a:effectRef>
+          <a:fontRef idx="minor">
+            <a:schemeClr val="tx1"/>
+          </a:fontRef>
+        </p:style>
+      </p:cxnSp>
+      <p:cxnSp>
+        <p:nvCxnSpPr>
+          <p:cNvPr id="49" name="Straight Connector 48">
+            <a:extLst>
+              <a:ext uri="{FF2B5EF4-FFF2-40B4-BE49-F238E27FC236}">
+                <a16:creationId xmlns:a16="http://schemas.microsoft.com/office/drawing/2014/main" id="{A9A018AA-EC97-A802-6EBA-E59E0E929E96}"/>
+              </a:ext>
+            </a:extLst>
+          </p:cNvPr>
+          <p:cNvCxnSpPr>
+            <a:cxnSpLocks/>
+          </p:cNvCxnSpPr>
+          <p:nvPr/>
+        </p:nvCxnSpPr>
+        <p:spPr>
+          <a:xfrm flipV="1">
+            <a:off x="10278926" y="180300"/>
+            <a:ext cx="74115" cy="58240"/>
+          </a:xfrm>
+          <a:prstGeom prst="line">
+            <a:avLst/>
+          </a:prstGeom>
+          <a:ln>
+            <a:solidFill>
+              <a:schemeClr val="tx1"/>
+            </a:solidFill>
+          </a:ln>
+        </p:spPr>
+        <p:style>
+          <a:lnRef idx="1">
+            <a:schemeClr val="accent1"/>
+          </a:lnRef>
+          <a:fillRef idx="0">
+            <a:schemeClr val="accent1"/>
+          </a:fillRef>
+          <a:effectRef idx="0">
+            <a:schemeClr val="accent1"/>
+          </a:effectRef>
+          <a:fontRef idx="minor">
+            <a:schemeClr val="tx1"/>
+          </a:fontRef>
+        </p:style>
+      </p:cxnSp>
+      <p:cxnSp>
+        <p:nvCxnSpPr>
+          <p:cNvPr id="50" name="Straight Connector 49">
+            <a:extLst>
+              <a:ext uri="{FF2B5EF4-FFF2-40B4-BE49-F238E27FC236}">
+                <a16:creationId xmlns:a16="http://schemas.microsoft.com/office/drawing/2014/main" id="{902C1ACD-CB40-8DBD-5A49-958FE7B331EB}"/>
+              </a:ext>
+            </a:extLst>
+          </p:cNvPr>
+          <p:cNvCxnSpPr>
+            <a:cxnSpLocks/>
+          </p:cNvCxnSpPr>
+          <p:nvPr/>
+        </p:nvCxnSpPr>
+        <p:spPr>
+          <a:xfrm flipV="1">
+            <a:off x="9932614" y="181160"/>
+            <a:ext cx="74115" cy="58240"/>
+          </a:xfrm>
+          <a:prstGeom prst="line">
+            <a:avLst/>
+          </a:prstGeom>
+          <a:ln>
+            <a:solidFill>
+              <a:schemeClr val="tx1"/>
+            </a:solidFill>
+          </a:ln>
+        </p:spPr>
+        <p:style>
+          <a:lnRef idx="1">
+            <a:schemeClr val="accent1"/>
+          </a:lnRef>
+          <a:fillRef idx="0">
+            <a:schemeClr val="accent1"/>
+          </a:fillRef>
+          <a:effectRef idx="0">
+            <a:schemeClr val="accent1"/>
+          </a:effectRef>
+          <a:fontRef idx="minor">
+            <a:schemeClr val="tx1"/>
+          </a:fontRef>
+        </p:style>
+      </p:cxnSp>
+      <p:sp>
+        <p:nvSpPr>
+          <p:cNvPr id="53" name="TextBox 52">
+            <a:extLst>
+              <a:ext uri="{FF2B5EF4-FFF2-40B4-BE49-F238E27FC236}">
+                <a16:creationId xmlns:a16="http://schemas.microsoft.com/office/drawing/2014/main" id="{6425CD44-BD70-24CA-F8B7-4B6EB0525AF9}"/>
+              </a:ext>
+            </a:extLst>
+          </p:cNvPr>
+          <p:cNvSpPr txBox="1"/>
+          <p:nvPr/>
+        </p:nvSpPr>
+        <p:spPr>
+          <a:xfrm>
+            <a:off x="5837401" y="2715328"/>
+            <a:ext cx="1592459" cy="369332"/>
+          </a:xfrm>
+          <a:prstGeom prst="rect">
+            <a:avLst/>
+          </a:prstGeom>
+          <a:noFill/>
+        </p:spPr>
+        <p:txBody>
+          <a:bodyPr wrap="square" rtlCol="0">
+            <a:spAutoFit/>
+          </a:bodyPr>
+          <a:lstStyle/>
+          <a:p>
+            <a:r>
+              <a:rPr lang="en-US" sz="1800" b="0" strike="noStrike" spc="-1" dirty="0" err="1">
+                <a:latin typeface="Arial"/>
+              </a:rPr>
+              <a:t>Analogique</a:t>
+            </a:r>
+            <a:endParaRPr lang="fr-FR" dirty="0"/>
           </a:p>
         </p:txBody>
       </p:sp>

</xml_diff>